<commit_message>
test pptx w/  single document
</commit_message>
<xml_diff>
--- a/cdp_backend/tests/resources/example_multi_slide.pptx
+++ b/cdp_backend/tests/resources/example_multi_slide.pptx
@@ -464,6 +464,93 @@
     </a:lvl9pPr>
   </p:notesStyle>
 </p:notesMaster>
+</file>
+
+<file path=ppt/notesSlides/notesSlide1.xml><?xml version="1.0" encoding="utf-8"?>
+<p:notes xmlns:a="http://schemas.openxmlformats.org/drawingml/2006/main" xmlns:r="http://schemas.openxmlformats.org/officeDocument/2006/relationships" xmlns:p="http://schemas.openxmlformats.org/presentationml/2006/main">
+  <p:cSld>
+    <p:spTree>
+      <p:nvGrpSpPr>
+        <p:cNvPr id="1" name=""/>
+        <p:cNvGrpSpPr/>
+        <p:nvPr/>
+      </p:nvGrpSpPr>
+      <p:grpSpPr>
+        <a:xfrm>
+          <a:off x="0" y="0"/>
+          <a:ext cx="0" cy="0"/>
+          <a:chOff x="0" y="0"/>
+          <a:chExt cx="0" cy="0"/>
+        </a:xfrm>
+      </p:grpSpPr>
+      <p:sp>
+        <p:nvSpPr>
+          <p:cNvPr id="2" name="Slide Image Placeholder 1"/>
+          <p:cNvSpPr>
+            <a:spLocks noGrp="1" noRot="1" noChangeAspect="1"/>
+          </p:cNvSpPr>
+          <p:nvPr>
+            <p:ph type="sldImg"/>
+          </p:nvPr>
+        </p:nvSpPr>
+        <p:spPr/>
+      </p:sp>
+      <p:sp>
+        <p:nvSpPr>
+          <p:cNvPr id="3" name="Notes Placeholder 2"/>
+          <p:cNvSpPr>
+            <a:spLocks noGrp="1"/>
+          </p:cNvSpPr>
+          <p:nvPr>
+            <p:ph type="body" idx="1"/>
+          </p:nvPr>
+        </p:nvSpPr>
+        <p:spPr/>
+        <p:txBody>
+          <a:bodyPr/>
+          <a:lstStyle/>
+          <a:p>
+            <a:r>
+              <a:rPr lang="en-US" dirty="0"/>
+              <a:t>Word5 word6</a:t>
+            </a:r>
+          </a:p>
+        </p:txBody>
+      </p:sp>
+      <p:sp>
+        <p:nvSpPr>
+          <p:cNvPr id="4" name="Slide Number Placeholder 3"/>
+          <p:cNvSpPr>
+            <a:spLocks noGrp="1"/>
+          </p:cNvSpPr>
+          <p:nvPr>
+            <p:ph type="sldNum" sz="quarter" idx="5"/>
+          </p:nvPr>
+        </p:nvSpPr>
+        <p:spPr/>
+        <p:txBody>
+          <a:bodyPr/>
+          <a:lstStyle/>
+          <a:p>
+            <a:fld id="{9D487A7A-EAC7-9B41-A299-FE63E8C7EBF1}" type="slidenum">
+              <a:rPr lang="en-US" smtClean="0"/>
+              <a:t>1</a:t>
+            </a:fld>
+            <a:endParaRPr lang="en-US"/>
+          </a:p>
+        </p:txBody>
+      </p:sp>
+    </p:spTree>
+    <p:extLst>
+      <p:ext uri="{BB962C8B-B14F-4D97-AF65-F5344CB8AC3E}">
+        <p14:creationId xmlns:p14="http://schemas.microsoft.com/office/powerpoint/2010/main" val="1323837967"/>
+      </p:ext>
+    </p:extLst>
+  </p:cSld>
+  <p:clrMapOvr>
+    <a:masterClrMapping/>
+  </p:clrMapOvr>
+</p:notes>
 </file>
 
 <file path=ppt/slideLayouts/slideLayout1.xml><?xml version="1.0" encoding="utf-8"?>
@@ -3703,7 +3790,7 @@
           <a:p>
             <a:r>
               <a:rPr lang="en-US" dirty="0"/>
-              <a:t>Foo</a:t>
+              <a:t>Word1</a:t>
             </a:r>
           </a:p>
         </p:txBody>
@@ -3731,13 +3818,13 @@
           <a:p>
             <a:r>
               <a:rPr lang="en-US" dirty="0"/>
-              <a:t>Legislative Analyst</a:t>
+              <a:t>word2 word3</a:t>
             </a:r>
           </a:p>
           <a:p>
             <a:r>
               <a:rPr lang="en-US" dirty="0"/>
-              <a:t>2019</a:t>
+              <a:t>word4</a:t>
             </a:r>
           </a:p>
         </p:txBody>
@@ -3795,7 +3882,7 @@
           <a:p>
             <a:r>
               <a:rPr lang="en-US" dirty="0"/>
-              <a:t>CB13290</a:t>
+              <a:t>word7</a:t>
             </a:r>
           </a:p>
         </p:txBody>
@@ -3823,21 +3910,21 @@
           <a:p>
             <a:r>
               <a:rPr lang="en-US" dirty="0"/>
-              <a:t>Text here</a:t>
+              <a:t>word8</a:t>
             </a:r>
           </a:p>
           <a:p>
             <a:pPr lvl="1"/>
             <a:r>
               <a:rPr lang="en-US" dirty="0"/>
-              <a:t>Indent</a:t>
+              <a:t>word9</a:t>
             </a:r>
           </a:p>
           <a:p>
             <a:pPr lvl="2"/>
             <a:r>
               <a:rPr lang="en-US" dirty="0"/>
-              <a:t>Indent </a:t>
+              <a:t>word10 </a:t>
             </a:r>
           </a:p>
         </p:txBody>
@@ -3895,7 +3982,7 @@
           <a:p>
             <a:r>
               <a:rPr lang="en-US" dirty="0"/>
-              <a:t>Slide3</a:t>
+              <a:t>word11</a:t>
             </a:r>
           </a:p>
         </p:txBody>
@@ -3922,8 +4009,50 @@
           <a:lstStyle/>
           <a:p>
             <a:r>
-              <a:rPr lang="en-US" dirty="0"/>
-              <a:t>Written communication</a:t>
+              <a:rPr lang="en-US"/>
+              <a:t>Word12 word13</a:t>
+            </a:r>
+            <a:endParaRPr lang="en-US" dirty="0"/>
+          </a:p>
+        </p:txBody>
+      </p:sp>
+      <p:sp>
+        <p:nvSpPr>
+          <p:cNvPr id="5" name="TextBox 4">
+            <a:extLst>
+              <a:ext uri="{FF2B5EF4-FFF2-40B4-BE49-F238E27FC236}">
+                <a16:creationId xmlns:a16="http://schemas.microsoft.com/office/drawing/2014/main" id="{D3D4FD6D-ED8B-E4FF-6F99-29248055C394}"/>
+              </a:ext>
+            </a:extLst>
+          </p:cNvPr>
+          <p:cNvSpPr txBox="1"/>
+          <p:nvPr/>
+        </p:nvSpPr>
+        <p:spPr>
+          <a:xfrm>
+            <a:off x="326571" y="6322423"/>
+            <a:ext cx="941120" cy="369332"/>
+          </a:xfrm>
+          <a:prstGeom prst="rect">
+            <a:avLst/>
+          </a:prstGeom>
+          <a:noFill/>
+        </p:spPr>
+        <p:txBody>
+          <a:bodyPr rot="0" spcFirstLastPara="0" vertOverflow="overflow" horzOverflow="overflow" vert="horz" wrap="square" lIns="91440" tIns="45720" rIns="91440" bIns="45720" numCol="1" spcCol="0" rtlCol="0" fromWordArt="0" anchor="t" anchorCtr="0" forceAA="0" compatLnSpc="1">
+            <a:prstTxWarp prst="textNoShape">
+              <a:avLst/>
+            </a:prstTxWarp>
+            <a:spAutoFit/>
+          </a:bodyPr>
+          <a:lstStyle/>
+          <a:p>
+            <a:pPr algn="l"/>
+            <a:r>
+              <a:rPr lang="en-US" dirty="0">
+                <a:cs typeface="Times New Roman"/>
+              </a:rPr>
+              <a:t>word14</a:t>
             </a:r>
           </a:p>
         </p:txBody>

</xml_diff>